<commit_message>
Update Lesson 4 + fix lesson 3 spelling mistake
</commit_message>
<xml_diff>
--- a/20241029-lesson3.pptx
+++ b/20241029-lesson3.pptx
@@ -4009,7 +4009,31 @@
                 <a:ea typeface="+mj-ea"/>
                 <a:cs typeface="+mj-cs"/>
               </a:rPr>
-              <a:t>Lesson 2: 20241029  T</a:t>
+              <a:t>Lesson </a:t>
+            </a:r>
+            <a:r>
+              <a:rPr lang="en-US" altLang="zh-CN" sz="3400" kern="1200" dirty="0">
+                <a:solidFill>
+                  <a:srgbClr val="FFFFFF"/>
+                </a:solidFill>
+                <a:effectLst/>
+                <a:latin typeface="+mj-lt"/>
+                <a:ea typeface="+mj-ea"/>
+                <a:cs typeface="+mj-cs"/>
+              </a:rPr>
+              <a:t>3</a:t>
+            </a:r>
+            <a:r>
+              <a:rPr lang="en-US" sz="3400" kern="1200" dirty="0">
+                <a:solidFill>
+                  <a:srgbClr val="FFFFFF"/>
+                </a:solidFill>
+                <a:effectLst/>
+                <a:latin typeface="+mj-lt"/>
+                <a:ea typeface="+mj-ea"/>
+                <a:cs typeface="+mj-cs"/>
+              </a:rPr>
+              <a:t>: 20241029  Tue</a:t>
             </a:r>
             <a:endParaRPr lang="en-US" sz="3400" kern="1200" dirty="0">
               <a:solidFill>

</xml_diff>